<commit_message>
Minor updates to NMF
</commit_message>
<xml_diff>
--- a/NMF/GLBIO2019_NMF.pptx
+++ b/NMF/GLBIO2019_NMF.pptx
@@ -207,7 +207,7 @@
           <a:p>
             <a:fld id="{C38776E9-1802-FB44-8AD1-BDE175A78723}" type="datetimeFigureOut">
               <a:rPr lang="en-US" smtClean="0"/>
-              <a:t>5/19/19</a:t>
+              <a:t>5/20/19</a:t>
             </a:fld>
             <a:endParaRPr lang="en-US"/>
           </a:p>
@@ -773,7 +773,7 @@
           <a:p>
             <a:fld id="{8052E4CF-FC11-1C41-A5B7-1EDEE817A6B9}" type="datetimeFigureOut">
               <a:rPr lang="en-US" smtClean="0"/>
-              <a:t>5/19/19</a:t>
+              <a:t>5/20/19</a:t>
             </a:fld>
             <a:endParaRPr lang="en-US"/>
           </a:p>
@@ -943,7 +943,7 @@
           <a:p>
             <a:fld id="{8052E4CF-FC11-1C41-A5B7-1EDEE817A6B9}" type="datetimeFigureOut">
               <a:rPr lang="en-US" smtClean="0"/>
-              <a:t>5/19/19</a:t>
+              <a:t>5/20/19</a:t>
             </a:fld>
             <a:endParaRPr lang="en-US"/>
           </a:p>
@@ -1123,7 +1123,7 @@
           <a:p>
             <a:fld id="{8052E4CF-FC11-1C41-A5B7-1EDEE817A6B9}" type="datetimeFigureOut">
               <a:rPr lang="en-US" smtClean="0"/>
-              <a:t>5/19/19</a:t>
+              <a:t>5/20/19</a:t>
             </a:fld>
             <a:endParaRPr lang="en-US"/>
           </a:p>
@@ -1293,7 +1293,7 @@
           <a:p>
             <a:fld id="{8052E4CF-FC11-1C41-A5B7-1EDEE817A6B9}" type="datetimeFigureOut">
               <a:rPr lang="en-US" smtClean="0"/>
-              <a:t>5/19/19</a:t>
+              <a:t>5/20/19</a:t>
             </a:fld>
             <a:endParaRPr lang="en-US"/>
           </a:p>
@@ -1537,7 +1537,7 @@
           <a:p>
             <a:fld id="{8052E4CF-FC11-1C41-A5B7-1EDEE817A6B9}" type="datetimeFigureOut">
               <a:rPr lang="en-US" smtClean="0"/>
-              <a:t>5/19/19</a:t>
+              <a:t>5/20/19</a:t>
             </a:fld>
             <a:endParaRPr lang="en-US"/>
           </a:p>
@@ -1769,7 +1769,7 @@
           <a:p>
             <a:fld id="{8052E4CF-FC11-1C41-A5B7-1EDEE817A6B9}" type="datetimeFigureOut">
               <a:rPr lang="en-US" smtClean="0"/>
-              <a:t>5/19/19</a:t>
+              <a:t>5/20/19</a:t>
             </a:fld>
             <a:endParaRPr lang="en-US"/>
           </a:p>
@@ -2136,7 +2136,7 @@
           <a:p>
             <a:fld id="{8052E4CF-FC11-1C41-A5B7-1EDEE817A6B9}" type="datetimeFigureOut">
               <a:rPr lang="en-US" smtClean="0"/>
-              <a:t>5/19/19</a:t>
+              <a:t>5/20/19</a:t>
             </a:fld>
             <a:endParaRPr lang="en-US"/>
           </a:p>
@@ -2254,7 +2254,7 @@
           <a:p>
             <a:fld id="{8052E4CF-FC11-1C41-A5B7-1EDEE817A6B9}" type="datetimeFigureOut">
               <a:rPr lang="en-US" smtClean="0"/>
-              <a:t>5/19/19</a:t>
+              <a:t>5/20/19</a:t>
             </a:fld>
             <a:endParaRPr lang="en-US"/>
           </a:p>
@@ -2349,7 +2349,7 @@
           <a:p>
             <a:fld id="{8052E4CF-FC11-1C41-A5B7-1EDEE817A6B9}" type="datetimeFigureOut">
               <a:rPr lang="en-US" smtClean="0"/>
-              <a:t>5/19/19</a:t>
+              <a:t>5/20/19</a:t>
             </a:fld>
             <a:endParaRPr lang="en-US"/>
           </a:p>
@@ -2626,7 +2626,7 @@
           <a:p>
             <a:fld id="{8052E4CF-FC11-1C41-A5B7-1EDEE817A6B9}" type="datetimeFigureOut">
               <a:rPr lang="en-US" smtClean="0"/>
-              <a:t>5/19/19</a:t>
+              <a:t>5/20/19</a:t>
             </a:fld>
             <a:endParaRPr lang="en-US"/>
           </a:p>
@@ -2883,7 +2883,7 @@
           <a:p>
             <a:fld id="{8052E4CF-FC11-1C41-A5B7-1EDEE817A6B9}" type="datetimeFigureOut">
               <a:rPr lang="en-US" smtClean="0"/>
-              <a:t>5/19/19</a:t>
+              <a:t>5/20/19</a:t>
             </a:fld>
             <a:endParaRPr lang="en-US"/>
           </a:p>
@@ -3096,7 +3096,7 @@
           <a:p>
             <a:fld id="{8052E4CF-FC11-1C41-A5B7-1EDEE817A6B9}" type="datetimeFigureOut">
               <a:rPr lang="en-US" smtClean="0"/>
-              <a:t>5/19/19</a:t>
+              <a:t>5/20/19</a:t>
             </a:fld>
             <a:endParaRPr lang="en-US"/>
           </a:p>
@@ -3850,8 +3850,8 @@
           </a:p>
         </p:txBody>
       </p:sp>
-      <mc:AlternateContent xmlns:mc="http://schemas.openxmlformats.org/markup-compatibility/2006">
-        <mc:Choice xmlns:a14="http://schemas.microsoft.com/office/drawing/2010/main" Requires="a14">
+      <mc:AlternateContent xmlns:mc="http://schemas.openxmlformats.org/markup-compatibility/2006" xmlns:a14="http://schemas.microsoft.com/office/drawing/2010/main">
+        <mc:Choice Requires="a14">
           <p:sp>
             <p:nvSpPr>
               <p:cNvPr id="6" name="TextBox 5">
@@ -3880,6 +3880,7 @@
               </a:bodyPr>
               <a:lstStyle/>
               <a:p>
+                <a:pPr/>
                 <a14:m>
                   <m:oMathPara xmlns:m="http://schemas.openxmlformats.org/officeDocument/2006/math">
                     <m:oMathParaPr>
@@ -3918,7 +3919,7 @@
             </p:txBody>
           </p:sp>
         </mc:Choice>
-        <mc:Fallback>
+        <mc:Fallback xmlns="">
           <p:sp>
             <p:nvSpPr>
               <p:cNvPr id="6" name="TextBox 5">
@@ -4194,8 +4195,8 @@
           </a:prstGeom>
         </p:spPr>
       </p:pic>
-      <mc:AlternateContent xmlns:mc="http://schemas.openxmlformats.org/markup-compatibility/2006">
-        <mc:Choice xmlns:a14="http://schemas.microsoft.com/office/drawing/2010/main" Requires="a14">
+      <mc:AlternateContent xmlns:mc="http://schemas.openxmlformats.org/markup-compatibility/2006" xmlns:a14="http://schemas.microsoft.com/office/drawing/2010/main">
+        <mc:Choice Requires="a14">
           <p:sp>
             <p:nvSpPr>
               <p:cNvPr id="5" name="TextBox 4">
@@ -4224,6 +4225,7 @@
               </a:bodyPr>
               <a:lstStyle/>
               <a:p>
+                <a:pPr/>
                 <a14:m>
                   <m:oMathPara xmlns:m="http://schemas.openxmlformats.org/officeDocument/2006/math">
                     <m:oMathParaPr>
@@ -4262,7 +4264,7 @@
             </p:txBody>
           </p:sp>
         </mc:Choice>
-        <mc:Fallback>
+        <mc:Fallback xmlns="">
           <p:sp>
             <p:nvSpPr>
               <p:cNvPr id="5" name="TextBox 4">
@@ -7738,8 +7740,8 @@
           </a:p>
         </p:txBody>
       </p:sp>
-      <mc:AlternateContent xmlns:mc="http://schemas.openxmlformats.org/markup-compatibility/2006" xmlns:a14="http://schemas.microsoft.com/office/drawing/2010/main">
-        <mc:Choice Requires="a14">
+      <mc:AlternateContent xmlns:mc="http://schemas.openxmlformats.org/markup-compatibility/2006">
+        <mc:Choice xmlns:a14="http://schemas.microsoft.com/office/drawing/2010/main" Requires="a14">
           <p:sp>
             <p:nvSpPr>
               <p:cNvPr id="3" name="Content Placeholder 2">
@@ -7818,7 +7820,15 @@
                 </a14:m>
                 <a:r>
                   <a:rPr lang="en-US" sz="2200" dirty="0"/>
-                  <a:t> and compare Silhouette score </a:t>
+                  <a:t> and compare Silhouette score</a:t>
+                </a:r>
+                <a:r>
+                  <a:rPr lang="en-US" sz="2200" baseline="30000" dirty="0"/>
+                  <a:t>1</a:t>
+                </a:r>
+                <a:r>
+                  <a:rPr lang="en-US" sz="2200" dirty="0"/>
+                  <a:t> </a:t>
                 </a:r>
               </a:p>
               <a:p>
@@ -7830,6 +7840,11 @@
                   <a:rPr lang="en-US" sz="2200" dirty="0"/>
                   <a:t> Eigenvalue elbow test (often doesn’t work in real-life datasets)</a:t>
                 </a:r>
+                <a:r>
+                  <a:rPr lang="en-US" sz="2400" baseline="30000" dirty="0"/>
+                  <a:t>2</a:t>
+                </a:r>
+                <a:endParaRPr lang="en-US" sz="2200" baseline="30000" dirty="0"/>
               </a:p>
               <a:p>
                 <a:pPr>
@@ -7854,10 +7869,65 @@
                 </a:pPr>
                 <a:endParaRPr lang="en-US" sz="2200" dirty="0"/>
               </a:p>
+              <a:p>
+                <a:pPr marL="0" indent="0">
+                  <a:buNone/>
+                </a:pPr>
+                <a:endParaRPr lang="en-US" sz="2200" dirty="0"/>
+              </a:p>
+              <a:p>
+                <a:pPr marL="0" indent="0">
+                  <a:buNone/>
+                </a:pPr>
+                <a:r>
+                  <a:rPr lang="en-US" sz="1400" baseline="30000" dirty="0"/>
+                  <a:t>1</a:t>
+                </a:r>
+                <a:r>
+                  <a:rPr lang="en-US" sz="1400" dirty="0"/>
+                  <a:t> </a:t>
+                </a:r>
+                <a:r>
+                  <a:rPr lang="en-US" sz="1400" dirty="0">
+                    <a:hlinkClick r:id="rId2"/>
+                  </a:rPr>
+                  <a:t>https://scikit-learn.org/stable/auto_examples/cluster/plot_kmeans_silhouette_analysis.html</a:t>
+                </a:r>
+                <a:endParaRPr lang="en-US" sz="1400" dirty="0"/>
+              </a:p>
+              <a:p>
+                <a:pPr marL="0" indent="0">
+                  <a:buNone/>
+                </a:pPr>
+                <a:r>
+                  <a:rPr lang="en-US" sz="1400" baseline="30000" dirty="0"/>
+                  <a:t>2</a:t>
+                </a:r>
+                <a:r>
+                  <a:rPr lang="en-US" sz="1400" dirty="0"/>
+                  <a:t> Von </a:t>
+                </a:r>
+                <a:r>
+                  <a:rPr lang="en-US" sz="1400" dirty="0" err="1"/>
+                  <a:t>Luxburg</a:t>
+                </a:r>
+                <a:r>
+                  <a:rPr lang="en-US" sz="1400" dirty="0"/>
+                  <a:t>, Ulrike. "A tutorial on spectral clustering." </a:t>
+                </a:r>
+                <a:r>
+                  <a:rPr lang="en-US" sz="1400" i="1" dirty="0"/>
+                  <a:t>Statistics and computing</a:t>
+                </a:r>
+                <a:r>
+                  <a:rPr lang="en-US" sz="1400" dirty="0"/>
+                  <a:t> 17.4 (2007): 395-416.</a:t>
+                </a:r>
+              </a:p>
             </p:txBody>
           </p:sp>
         </mc:Choice>
-        <mc:Fallback xmlns="">
+        <mc:Fallback>
           <p:sp>
             <p:nvSpPr>
               <p:cNvPr id="3" name="Content Placeholder 2">
@@ -7876,7 +7946,7 @@
             </p:nvSpPr>
             <p:spPr>
               <a:blipFill>
-                <a:blip r:embed="rId2"/>
+                <a:blip r:embed="rId3"/>
                 <a:stretch>
                   <a:fillRect l="-965" t="-1462"/>
                 </a:stretch>
@@ -8556,8 +8626,8 @@
           </a:p>
         </p:txBody>
       </p:sp>
-      <mc:AlternateContent xmlns:mc="http://schemas.openxmlformats.org/markup-compatibility/2006">
-        <mc:Choice xmlns:a14="http://schemas.microsoft.com/office/drawing/2010/main" Requires="a14">
+      <mc:AlternateContent xmlns:mc="http://schemas.openxmlformats.org/markup-compatibility/2006" xmlns:a14="http://schemas.microsoft.com/office/drawing/2010/main">
+        <mc:Choice Requires="a14">
           <p:sp>
             <p:nvSpPr>
               <p:cNvPr id="4" name="TextBox 3">
@@ -8586,6 +8656,7 @@
               </a:bodyPr>
               <a:lstStyle/>
               <a:p>
+                <a:pPr/>
                 <a14:m>
                   <m:oMathPara xmlns:m="http://schemas.openxmlformats.org/officeDocument/2006/math">
                     <m:oMathParaPr>
@@ -8624,7 +8695,7 @@
             </p:txBody>
           </p:sp>
         </mc:Choice>
-        <mc:Fallback>
+        <mc:Fallback xmlns="">
           <p:sp>
             <p:nvSpPr>
               <p:cNvPr id="4" name="TextBox 3">

</xml_diff>